<commit_message>
lab 7.02 and lecture 7.03
</commit_message>
<xml_diff>
--- a/labs/WSAA07.03 python and SQLed.pptx
+++ b/labs/WSAA07.03 python and SQLed.pptx
@@ -302,7 +302,7 @@
             <a:pPr algn="r">
               <a:buNone/>
             </a:pPr>
-            <a:fld id="{A758FBFD-2163-487B-93CF-55B3E22B2FF7}" type="slidenum">
+            <a:fld id="{412D2D3C-C7D3-40B2-85A4-3968E7495B0F}" type="slidenum">
               <a:rPr b="0" lang="en-IE" sz="1400" spc="-1" strike="noStrike">
                 <a:latin typeface="Times New Roman"/>
               </a:rPr>
@@ -350,7 +350,7 @@
         <p:spPr>
           <a:xfrm>
             <a:off x="216000" y="812520"/>
-            <a:ext cx="7126920" cy="4008600"/>
+            <a:ext cx="7126560" cy="4008240"/>
           </a:xfrm>
           <a:prstGeom prst="rect">
             <a:avLst/>
@@ -373,7 +373,7 @@
         <p:spPr>
           <a:xfrm>
             <a:off x="756000" y="5078520"/>
-            <a:ext cx="6047280" cy="4810680"/>
+            <a:ext cx="6046920" cy="4810320"/>
           </a:xfrm>
           <a:prstGeom prst="rect">
             <a:avLst/>
@@ -393,6 +393,9 @@
                 <a:spcPct val="100000"/>
               </a:lnSpc>
               <a:buNone/>
+              <a:tabLst>
+                <a:tab algn="l" pos="0"/>
+              </a:tabLst>
             </a:pPr>
             <a:r>
               <a:rPr b="0" lang="en-IE" sz="2000" spc="-1" strike="noStrike">
@@ -416,6 +419,9 @@
                 <a:spcPct val="100000"/>
               </a:lnSpc>
               <a:buNone/>
+              <a:tabLst>
+                <a:tab algn="l" pos="0"/>
+              </a:tabLst>
             </a:pPr>
             <a:r>
               <a:rPr b="0" lang="en-IE" sz="2000" spc="-1" strike="noStrike">
@@ -430,6 +436,124 @@
               <a:t>Creating a DAO that encapsulates the interactions with the Database</a:t>
             </a:r>
             <a:endParaRPr b="0" lang="en-IE" sz="2000" spc="-1" strike="noStrike">
+              <a:latin typeface="Arial"/>
+            </a:endParaRPr>
+          </a:p>
+        </p:txBody>
+      </p:sp>
+    </p:spTree>
+  </p:cSld>
+</p:notes>
+</file>
+
+<file path=ppt/notesSlides/notesSlide10.xml><?xml version="1.0" encoding="utf-8"?>
+<p:notes xmlns:a="http://schemas.openxmlformats.org/drawingml/2006/main" xmlns:p="http://schemas.openxmlformats.org/presentationml/2006/main" xmlns:r="http://schemas.openxmlformats.org/officeDocument/2006/relationships" xmlns:p14="http://schemas.microsoft.com/office/powerpoint/2010/main" xmlns:p15="http://schemas.microsoft.com/office/powerpoint/2012/main" xmlns:mc="http://schemas.openxmlformats.org/markup-compatibility/2006">
+  <p:cSld>
+    <p:spTree>
+      <p:nvGrpSpPr>
+        <p:cNvPr id="1" name=""/>
+        <p:cNvGrpSpPr/>
+        <p:nvPr/>
+      </p:nvGrpSpPr>
+      <p:grpSpPr>
+        <a:xfrm>
+          <a:off x="0" y="0"/>
+          <a:ext cx="0" cy="0"/>
+          <a:chOff x="0" y="0"/>
+          <a:chExt cx="0" cy="0"/>
+        </a:xfrm>
+      </p:grpSpPr>
+      <p:sp>
+        <p:nvSpPr>
+          <p:cNvPr id="137" name="PlaceHolder 1"/>
+          <p:cNvSpPr>
+            <a:spLocks noGrp="1"/>
+          </p:cNvSpPr>
+          <p:nvPr>
+            <p:ph type="sldImg"/>
+          </p:nvPr>
+        </p:nvSpPr>
+        <p:spPr>
+          <a:xfrm>
+            <a:off x="216000" y="812520"/>
+            <a:ext cx="7127280" cy="4008960"/>
+          </a:xfrm>
+          <a:prstGeom prst="rect">
+            <a:avLst/>
+          </a:prstGeom>
+          <a:ln w="0">
+            <a:noFill/>
+          </a:ln>
+        </p:spPr>
+      </p:sp>
+      <p:sp>
+        <p:nvSpPr>
+          <p:cNvPr id="138" name="PlaceHolder 2"/>
+          <p:cNvSpPr>
+            <a:spLocks noGrp="1"/>
+          </p:cNvSpPr>
+          <p:nvPr>
+            <p:ph type="body"/>
+          </p:nvPr>
+        </p:nvSpPr>
+        <p:spPr>
+          <a:xfrm>
+            <a:off x="90000" y="4821480"/>
+            <a:ext cx="7290000" cy="5528520"/>
+          </a:xfrm>
+          <a:prstGeom prst="rect">
+            <a:avLst/>
+          </a:prstGeom>
+          <a:noFill/>
+          <a:ln w="0">
+            <a:noFill/>
+          </a:ln>
+        </p:spPr>
+        <p:txBody>
+          <a:bodyPr lIns="0" rIns="0" tIns="0" bIns="0" anchor="t">
+            <a:noAutofit/>
+          </a:bodyPr>
+          <a:p>
+            <a:r>
+              <a:rPr b="0" lang="en-IE" sz="1800" spc="-1" strike="noStrike">
+                <a:latin typeface="Arial"/>
+              </a:rPr>
+              <a:t>you can now connect to a database and you can do it through a object DAO. So therefore it's separated from your REST server and it's all so you can concentrate. When you're looking at the data you can concentrate the database and when you're looking at this Flask server you can concentrate on your mapping. You now have a standard way of storing data in and out of a database during the code operations. If you need to add in other functionality, you can do that by adding a new function in your DAO.</a:t>
+            </a:r>
+            <a:endParaRPr b="0" lang="en-IE" sz="1800" spc="-1" strike="noStrike">
+              <a:latin typeface="Arial"/>
+            </a:endParaRPr>
+          </a:p>
+          <a:p>
+            <a:r>
+              <a:rPr b="0" lang="en-IE" sz="1800" spc="-1" strike="noStrike">
+                <a:latin typeface="Arial"/>
+              </a:rPr>
+              <a:t>pretty much shown you how to put it into a Flask application. I'm going to leave that to yourself. Pretty much we should have put the information into configuration file. I didn't do that. Uh, There's only one connection. You should really have connection pooling. If you're putting this into into a server.</a:t>
+            </a:r>
+            <a:endParaRPr b="0" lang="en-IE" sz="1800" spc="-1" strike="noStrike">
+              <a:latin typeface="Arial"/>
+            </a:endParaRPr>
+          </a:p>
+          <a:p>
+            <a:r>
+              <a:rPr b="0" lang="en-IE" sz="1800" spc="-1" strike="noStrike">
+                <a:latin typeface="Arial"/>
+              </a:rPr>
+              <a:t>Connection pooling is quite trivial to do. You can add that in. I don't know if you've done that in advanced databases. There were other frameworks out there for dealing with databases like SQL Academy</a:t>
+            </a:r>
+            <a:endParaRPr b="0" lang="en-IE" sz="1800" spc="-1" strike="noStrike">
+              <a:latin typeface="Arial"/>
+            </a:endParaRPr>
+          </a:p>
+          <a:p>
+            <a:r>
+              <a:rPr b="0" lang="en-IE" sz="1800" spc="-1" strike="noStrike">
+                <a:latin typeface="Arial"/>
+              </a:rPr>
+              <a:t>and if you're dealing with multiple tables then you will need multiple Daos. Was like you don't need I would suggest you use multiple GEOS. And of course I should have a quick chat about combining database tables, you know, so getting the ID from another database table from one database table.</a:t>
+            </a:r>
+            <a:endParaRPr b="0" lang="en-IE" sz="1800" spc="-1" strike="noStrike">
               <a:latin typeface="Arial"/>
             </a:endParaRPr>
           </a:p>
@@ -470,7 +594,7 @@
         <p:spPr>
           <a:xfrm>
             <a:off x="216000" y="812520"/>
-            <a:ext cx="7127280" cy="4008960"/>
+            <a:ext cx="7126920" cy="4008600"/>
           </a:xfrm>
           <a:prstGeom prst="rect">
             <a:avLst/>
@@ -493,7 +617,7 @@
         <p:spPr>
           <a:xfrm>
             <a:off x="756000" y="5078520"/>
-            <a:ext cx="6047640" cy="4811040"/>
+            <a:ext cx="6047280" cy="4810680"/>
           </a:xfrm>
           <a:prstGeom prst="rect">
             <a:avLst/>
@@ -508,6 +632,12 @@
             <a:noAutofit/>
           </a:bodyPr>
           <a:p>
+            <a:pPr marL="216000" indent="-216000">
+              <a:lnSpc>
+                <a:spcPct val="100000"/>
+              </a:lnSpc>
+              <a:buNone/>
+            </a:pPr>
             <a:r>
               <a:rPr b="0" lang="en-IE" sz="2000" spc="-1" strike="noStrike">
                 <a:latin typeface="Arial"/>
@@ -519,40 +649,28 @@
             </a:endParaRPr>
           </a:p>
           <a:p>
+            <a:pPr marL="216000" indent="-216000">
+              <a:lnSpc>
+                <a:spcPct val="100000"/>
+              </a:lnSpc>
+              <a:buNone/>
+            </a:pPr>
             <a:endParaRPr b="0" lang="en-IE" sz="2000" spc="-1" strike="noStrike">
               <a:latin typeface="Arial"/>
             </a:endParaRPr>
           </a:p>
           <a:p>
+            <a:pPr marL="216000" indent="-216000">
+              <a:lnSpc>
+                <a:spcPct val="100000"/>
+              </a:lnSpc>
+              <a:buNone/>
+            </a:pPr>
             <a:r>
               <a:rPr b="0" lang="en-IE" sz="2000" spc="-1" strike="noStrike">
                 <a:latin typeface="Arial"/>
               </a:rPr>
-              <a:t>how would you write the Python to run those SQL </a:t>
-            </a:r>
-            <a:r>
-              <a:rPr b="0" lang="en-IE" sz="2000" spc="-1" strike="noStrike">
-                <a:latin typeface="Arial"/>
-              </a:rPr>
-              <a:t>statements on a MySQL database? simple answer </a:t>
-            </a:r>
-            <a:r>
-              <a:rPr b="0" lang="en-IE" sz="2000" spc="-1" strike="noStrike">
-                <a:latin typeface="Arial"/>
-              </a:rPr>
-              <a:t>to that is we'll use one of the MySQL packages </a:t>
-            </a:r>
-            <a:r>
-              <a:rPr b="0" lang="en-IE" sz="2000" spc="-1" strike="noStrike">
-                <a:latin typeface="Arial"/>
-              </a:rPr>
-              <a:t>that come with Python that you can get with </a:t>
-            </a:r>
-            <a:r>
-              <a:rPr b="0" lang="en-IE" sz="2000" spc="-1" strike="noStrike">
-                <a:latin typeface="Arial"/>
-              </a:rPr>
-              <a:t>Python</a:t>
+              <a:t>how would you write the Python to run those SQL statements on a MySQL database? simple answer to that is we'll use one of the MySQL packages that come with Python that you can get with Python</a:t>
             </a:r>
             <a:endParaRPr b="0" lang="en-IE" sz="2000" spc="-1" strike="noStrike">
               <a:latin typeface="Arial"/>
@@ -595,7 +713,7 @@
         <p:spPr>
           <a:xfrm>
             <a:off x="216000" y="812520"/>
-            <a:ext cx="7127280" cy="4008960"/>
+            <a:ext cx="7126920" cy="4008600"/>
           </a:xfrm>
           <a:prstGeom prst="rect">
             <a:avLst/>
@@ -618,7 +736,7 @@
         <p:spPr>
           <a:xfrm>
             <a:off x="225000" y="4923360"/>
-            <a:ext cx="6930000" cy="5516640"/>
+            <a:ext cx="6929640" cy="5516280"/>
           </a:xfrm>
           <a:prstGeom prst="rect">
             <a:avLst/>
@@ -633,6 +751,12 @@
             <a:noAutofit/>
           </a:bodyPr>
           <a:p>
+            <a:pPr marL="216000" indent="-216000">
+              <a:lnSpc>
+                <a:spcPct val="100000"/>
+              </a:lnSpc>
+              <a:buNone/>
+            </a:pPr>
             <a:r>
               <a:rPr b="0" lang="en-IE" sz="1500" spc="-1" strike="noStrike">
                 <a:latin typeface="Arial"/>
@@ -650,11 +774,23 @@
             </a:endParaRPr>
           </a:p>
           <a:p>
+            <a:pPr marL="216000" indent="-216000">
+              <a:lnSpc>
+                <a:spcPct val="100000"/>
+              </a:lnSpc>
+              <a:buNone/>
+            </a:pPr>
             <a:endParaRPr b="0" lang="en-IE" sz="2000" spc="-1" strike="noStrike">
               <a:latin typeface="Arial"/>
             </a:endParaRPr>
           </a:p>
           <a:p>
+            <a:pPr marL="216000" indent="-216000">
+              <a:lnSpc>
+                <a:spcPct val="100000"/>
+              </a:lnSpc>
+              <a:buNone/>
+            </a:pPr>
             <a:r>
               <a:rPr b="0" lang="en-IE" sz="1500" spc="-1" strike="noStrike">
                 <a:latin typeface="Arial"/>
@@ -666,11 +802,23 @@
             </a:endParaRPr>
           </a:p>
           <a:p>
+            <a:pPr marL="216000" indent="-216000">
+              <a:lnSpc>
+                <a:spcPct val="100000"/>
+              </a:lnSpc>
+              <a:buNone/>
+            </a:pPr>
             <a:endParaRPr b="0" lang="en-IE" sz="1500" spc="-1" strike="noStrike">
               <a:latin typeface="Arial"/>
             </a:endParaRPr>
           </a:p>
           <a:p>
+            <a:pPr marL="216000" indent="-216000">
+              <a:lnSpc>
+                <a:spcPct val="100000"/>
+              </a:lnSpc>
+              <a:buNone/>
+            </a:pPr>
             <a:r>
               <a:rPr b="0" lang="en-IE" sz="1500" spc="-1" strike="noStrike">
                 <a:latin typeface="Arial"/>
@@ -718,7 +866,7 @@
         <p:spPr>
           <a:xfrm>
             <a:off x="216000" y="812520"/>
-            <a:ext cx="7127280" cy="4008960"/>
+            <a:ext cx="7126920" cy="4008600"/>
           </a:xfrm>
           <a:prstGeom prst="rect">
             <a:avLst/>
@@ -741,7 +889,7 @@
         <p:spPr>
           <a:xfrm>
             <a:off x="135000" y="5078520"/>
-            <a:ext cx="7290000" cy="5951160"/>
+            <a:ext cx="7289640" cy="5950800"/>
           </a:xfrm>
           <a:prstGeom prst="rect">
             <a:avLst/>
@@ -756,6 +904,12 @@
             <a:noAutofit/>
           </a:bodyPr>
           <a:p>
+            <a:pPr marL="216000" indent="-216000">
+              <a:lnSpc>
+                <a:spcPct val="100000"/>
+              </a:lnSpc>
+              <a:buNone/>
+            </a:pPr>
             <a:r>
               <a:rPr b="0" lang="en-IE" sz="1500" spc="-1" strike="noStrike">
                 <a:latin typeface="Arial"/>
@@ -767,11 +921,23 @@
             </a:endParaRPr>
           </a:p>
           <a:p>
+            <a:pPr marL="216000" indent="-216000">
+              <a:lnSpc>
+                <a:spcPct val="100000"/>
+              </a:lnSpc>
+              <a:buNone/>
+            </a:pPr>
             <a:endParaRPr b="0" lang="en-IE" sz="1400" spc="-1" strike="noStrike">
               <a:latin typeface="Arial"/>
             </a:endParaRPr>
           </a:p>
           <a:p>
+            <a:pPr marL="216000" indent="-216000">
+              <a:lnSpc>
+                <a:spcPct val="100000"/>
+              </a:lnSpc>
+              <a:buNone/>
+            </a:pPr>
             <a:r>
               <a:rPr b="0" lang="en-IE" sz="1500" spc="-1" strike="noStrike">
                 <a:latin typeface="Arial"/>
@@ -783,11 +949,23 @@
             </a:endParaRPr>
           </a:p>
           <a:p>
+            <a:pPr marL="216000" indent="-216000">
+              <a:lnSpc>
+                <a:spcPct val="100000"/>
+              </a:lnSpc>
+              <a:buNone/>
+            </a:pPr>
             <a:endParaRPr b="0" lang="en-IE" sz="1400" spc="-1" strike="noStrike">
               <a:latin typeface="Arial"/>
             </a:endParaRPr>
           </a:p>
           <a:p>
+            <a:pPr marL="216000" indent="-216000">
+              <a:lnSpc>
+                <a:spcPct val="100000"/>
+              </a:lnSpc>
+              <a:buNone/>
+            </a:pPr>
             <a:r>
               <a:rPr b="0" lang="en-IE" sz="1500" spc="-1" strike="noStrike">
                 <a:latin typeface="Arial"/>
@@ -805,11 +983,23 @@
             </a:endParaRPr>
           </a:p>
           <a:p>
+            <a:pPr marL="216000" indent="-216000">
+              <a:lnSpc>
+                <a:spcPct val="100000"/>
+              </a:lnSpc>
+              <a:buNone/>
+            </a:pPr>
             <a:endParaRPr b="0" lang="en-IE" sz="1400" spc="-1" strike="noStrike">
               <a:latin typeface="Arial"/>
             </a:endParaRPr>
           </a:p>
           <a:p>
+            <a:pPr marL="216000" indent="-216000">
+              <a:lnSpc>
+                <a:spcPct val="100000"/>
+              </a:lnSpc>
+              <a:buNone/>
+            </a:pPr>
             <a:r>
               <a:rPr b="0" lang="en-IE" sz="1500" spc="-1" strike="noStrike">
                 <a:latin typeface="Arial"/>
@@ -857,7 +1047,7 @@
         <p:spPr>
           <a:xfrm>
             <a:off x="216000" y="812520"/>
-            <a:ext cx="7127280" cy="4008960"/>
+            <a:ext cx="7126920" cy="4008600"/>
           </a:xfrm>
           <a:prstGeom prst="rect">
             <a:avLst/>
@@ -880,7 +1070,7 @@
         <p:spPr>
           <a:xfrm>
             <a:off x="90000" y="5078520"/>
-            <a:ext cx="7245000" cy="5417640"/>
+            <a:ext cx="7244640" cy="5417280"/>
           </a:xfrm>
           <a:prstGeom prst="rect">
             <a:avLst/>
@@ -895,6 +1085,12 @@
             <a:noAutofit/>
           </a:bodyPr>
           <a:p>
+            <a:pPr marL="216000" indent="-216000">
+              <a:lnSpc>
+                <a:spcPct val="100000"/>
+              </a:lnSpc>
+              <a:buNone/>
+            </a:pPr>
             <a:r>
               <a:rPr b="0" lang="en-IE" sz="1600" spc="-1" strike="noStrike">
                 <a:latin typeface="Arial"/>
@@ -906,11 +1102,23 @@
             </a:endParaRPr>
           </a:p>
           <a:p>
+            <a:pPr marL="216000" indent="-216000">
+              <a:lnSpc>
+                <a:spcPct val="100000"/>
+              </a:lnSpc>
+              <a:buNone/>
+            </a:pPr>
             <a:endParaRPr b="0" lang="en-IE" sz="1600" spc="-1" strike="noStrike">
               <a:latin typeface="Arial"/>
             </a:endParaRPr>
           </a:p>
           <a:p>
+            <a:pPr marL="216000" indent="-216000">
+              <a:lnSpc>
+                <a:spcPct val="100000"/>
+              </a:lnSpc>
+              <a:buNone/>
+            </a:pPr>
             <a:r>
               <a:rPr b="0" lang="en-IE" sz="1600" spc="-1" strike="noStrike">
                 <a:latin typeface="Arial"/>
@@ -922,11 +1130,23 @@
             </a:endParaRPr>
           </a:p>
           <a:p>
+            <a:pPr marL="216000" indent="-216000">
+              <a:lnSpc>
+                <a:spcPct val="100000"/>
+              </a:lnSpc>
+              <a:buNone/>
+            </a:pPr>
             <a:endParaRPr b="0" lang="en-IE" sz="1600" spc="-1" strike="noStrike">
               <a:latin typeface="Arial"/>
             </a:endParaRPr>
           </a:p>
           <a:p>
+            <a:pPr marL="216000" indent="-216000">
+              <a:lnSpc>
+                <a:spcPct val="100000"/>
+              </a:lnSpc>
+              <a:buNone/>
+            </a:pPr>
             <a:r>
               <a:rPr b="0" lang="en-IE" sz="1600" spc="-1" strike="noStrike">
                 <a:latin typeface="Arial"/>
@@ -938,11 +1158,23 @@
             </a:endParaRPr>
           </a:p>
           <a:p>
+            <a:pPr marL="216000" indent="-216000">
+              <a:lnSpc>
+                <a:spcPct val="100000"/>
+              </a:lnSpc>
+              <a:buNone/>
+            </a:pPr>
             <a:endParaRPr b="0" lang="en-IE" sz="1600" spc="-1" strike="noStrike">
               <a:latin typeface="Arial"/>
             </a:endParaRPr>
           </a:p>
           <a:p>
+            <a:pPr marL="216000" indent="-216000">
+              <a:lnSpc>
+                <a:spcPct val="100000"/>
+              </a:lnSpc>
+              <a:buNone/>
+            </a:pPr>
             <a:r>
               <a:rPr b="0" lang="en-IE" sz="1600" spc="-1" strike="noStrike">
                 <a:latin typeface="Arial"/>
@@ -954,11 +1186,23 @@
             </a:endParaRPr>
           </a:p>
           <a:p>
+            <a:pPr marL="216000" indent="-216000">
+              <a:lnSpc>
+                <a:spcPct val="100000"/>
+              </a:lnSpc>
+              <a:buNone/>
+            </a:pPr>
             <a:endParaRPr b="0" lang="en-IE" sz="1600" spc="-1" strike="noStrike">
               <a:latin typeface="Arial"/>
             </a:endParaRPr>
           </a:p>
           <a:p>
+            <a:pPr marL="216000" indent="-216000">
+              <a:lnSpc>
+                <a:spcPct val="100000"/>
+              </a:lnSpc>
+              <a:buNone/>
+            </a:pPr>
             <a:r>
               <a:rPr b="0" lang="en-IE" sz="1600" spc="-1" strike="noStrike">
                 <a:latin typeface="Arial"/>
@@ -1006,7 +1250,7 @@
         <p:spPr>
           <a:xfrm>
             <a:off x="216000" y="812520"/>
-            <a:ext cx="7127280" cy="4008960"/>
+            <a:ext cx="7126920" cy="4008600"/>
           </a:xfrm>
           <a:prstGeom prst="rect">
             <a:avLst/>
@@ -1029,7 +1273,7 @@
         <p:spPr>
           <a:xfrm>
             <a:off x="135000" y="5078520"/>
-            <a:ext cx="7290000" cy="5406480"/>
+            <a:ext cx="7289640" cy="5406120"/>
           </a:xfrm>
           <a:prstGeom prst="rect">
             <a:avLst/>
@@ -1044,6 +1288,12 @@
             <a:noAutofit/>
           </a:bodyPr>
           <a:p>
+            <a:pPr marL="216000" indent="-216000">
+              <a:lnSpc>
+                <a:spcPct val="100000"/>
+              </a:lnSpc>
+              <a:buNone/>
+            </a:pPr>
             <a:r>
               <a:rPr b="0" lang="en-IE" sz="1500" spc="-1" strike="noStrike">
                 <a:latin typeface="Arial"/>
@@ -1055,11 +1305,23 @@
             </a:endParaRPr>
           </a:p>
           <a:p>
+            <a:pPr marL="216000" indent="-216000">
+              <a:lnSpc>
+                <a:spcPct val="100000"/>
+              </a:lnSpc>
+              <a:buNone/>
+            </a:pPr>
             <a:endParaRPr b="0" lang="en-IE" sz="1400" spc="-1" strike="noStrike">
               <a:latin typeface="Arial"/>
             </a:endParaRPr>
           </a:p>
           <a:p>
+            <a:pPr marL="216000" indent="-216000">
+              <a:lnSpc>
+                <a:spcPct val="100000"/>
+              </a:lnSpc>
+              <a:buNone/>
+            </a:pPr>
             <a:r>
               <a:rPr b="0" lang="en-IE" sz="1500" spc="-1" strike="noStrike">
                 <a:latin typeface="Arial"/>
@@ -1071,6 +1333,12 @@
             </a:endParaRPr>
           </a:p>
           <a:p>
+            <a:pPr marL="216000" indent="-216000">
+              <a:lnSpc>
+                <a:spcPct val="100000"/>
+              </a:lnSpc>
+              <a:buNone/>
+            </a:pPr>
             <a:r>
               <a:rPr b="0" lang="en-IE" sz="1500" spc="-1" strike="noStrike">
                 <a:latin typeface="Arial"/>
@@ -1082,6 +1350,12 @@
             </a:endParaRPr>
           </a:p>
           <a:p>
+            <a:pPr marL="216000" indent="-216000">
+              <a:lnSpc>
+                <a:spcPct val="100000"/>
+              </a:lnSpc>
+              <a:buNone/>
+            </a:pPr>
             <a:r>
               <a:rPr b="0" lang="en-IE" sz="1500" spc="-1" strike="noStrike">
                 <a:latin typeface="Arial"/>
@@ -1113,6 +1387,140 @@
               <a:t> as a tuple uh in result. So for X in result. That will go through and get each row and put the values as a tuple into X. In this case I print them out so I'll print out all the rows as they are. You don't need to do commit because this is a read so we're not changing the database. And then you do cursor close and B dot close. &gt;&gt;my7createDatabase.py</a:t>
             </a:r>
             <a:endParaRPr b="0" lang="en-IE" sz="1500" spc="-1" strike="noStrike">
+              <a:latin typeface="Arial"/>
+            </a:endParaRPr>
+          </a:p>
+        </p:txBody>
+      </p:sp>
+    </p:spTree>
+  </p:cSld>
+</p:notes>
+</file>
+
+<file path=ppt/notesSlides/notesSlide8.xml><?xml version="1.0" encoding="utf-8"?>
+<p:notes xmlns:a="http://schemas.openxmlformats.org/drawingml/2006/main" xmlns:p="http://schemas.openxmlformats.org/presentationml/2006/main" xmlns:r="http://schemas.openxmlformats.org/officeDocument/2006/relationships" xmlns:p14="http://schemas.microsoft.com/office/powerpoint/2010/main" xmlns:p15="http://schemas.microsoft.com/office/powerpoint/2012/main" xmlns:mc="http://schemas.openxmlformats.org/markup-compatibility/2006">
+  <p:cSld>
+    <p:spTree>
+      <p:nvGrpSpPr>
+        <p:cNvPr id="1" name=""/>
+        <p:cNvGrpSpPr/>
+        <p:nvPr/>
+      </p:nvGrpSpPr>
+      <p:grpSpPr>
+        <a:xfrm>
+          <a:off x="0" y="0"/>
+          <a:ext cx="0" cy="0"/>
+          <a:chOff x="0" y="0"/>
+          <a:chExt cx="0" cy="0"/>
+        </a:xfrm>
+      </p:grpSpPr>
+      <p:sp>
+        <p:nvSpPr>
+          <p:cNvPr id="135" name="PlaceHolder 1"/>
+          <p:cNvSpPr>
+            <a:spLocks noGrp="1"/>
+          </p:cNvSpPr>
+          <p:nvPr>
+            <p:ph type="sldImg"/>
+          </p:nvPr>
+        </p:nvSpPr>
+        <p:spPr>
+          <a:xfrm>
+            <a:off x="216000" y="812520"/>
+            <a:ext cx="7127280" cy="4008960"/>
+          </a:xfrm>
+          <a:prstGeom prst="rect">
+            <a:avLst/>
+          </a:prstGeom>
+          <a:ln w="0">
+            <a:noFill/>
+          </a:ln>
+        </p:spPr>
+      </p:sp>
+      <p:sp>
+        <p:nvSpPr>
+          <p:cNvPr id="136" name="PlaceHolder 2"/>
+          <p:cNvSpPr>
+            <a:spLocks noGrp="1"/>
+          </p:cNvSpPr>
+          <p:nvPr>
+            <p:ph type="body"/>
+          </p:nvPr>
+        </p:nvSpPr>
+        <p:spPr>
+          <a:xfrm>
+            <a:off x="207720" y="4950000"/>
+            <a:ext cx="7127280" cy="5445000"/>
+          </a:xfrm>
+          <a:prstGeom prst="rect">
+            <a:avLst/>
+          </a:prstGeom>
+          <a:noFill/>
+          <a:ln w="0">
+            <a:noFill/>
+          </a:ln>
+        </p:spPr>
+        <p:txBody>
+          <a:bodyPr lIns="0" rIns="0" tIns="0" bIns="0" anchor="t">
+            <a:noAutofit/>
+          </a:bodyPr>
+          <a:p>
+            <a:r>
+              <a:rPr b="0" lang="en-IE" sz="2000" spc="-1" strike="noStrike">
+                <a:latin typeface="Arial"/>
+              </a:rPr>
+              <a:t> </a:t>
+            </a:r>
+            <a:r>
+              <a:rPr b="0" lang="en-IE" sz="2000" spc="-1" strike="noStrike">
+                <a:latin typeface="Arial"/>
+              </a:rPr>
+              <a:t>How do we put these into the DAO?</a:t>
+            </a:r>
+            <a:endParaRPr b="0" lang="en-IE" sz="2000" spc="-1" strike="noStrike">
+              <a:latin typeface="Arial"/>
+            </a:endParaRPr>
+          </a:p>
+          <a:p>
+            <a:endParaRPr b="0" lang="en-IE" sz="2000" spc="-1" strike="noStrike">
+              <a:latin typeface="Arial"/>
+            </a:endParaRPr>
+          </a:p>
+          <a:p>
+            <a:r>
+              <a:rPr b="0" lang="en-IE" sz="2000" spc="-1" strike="noStrike">
+                <a:latin typeface="Arial"/>
+              </a:rPr>
+              <a:t>Having all these in different files isn't that useful. Would be much handy if we could be reused. So for that reason we have the DAO, which I've already talked about in the first lecture in this series.</a:t>
+            </a:r>
+            <a:endParaRPr b="0" lang="en-IE" sz="2000" spc="-1" strike="noStrike">
+              <a:latin typeface="Arial"/>
+            </a:endParaRPr>
+          </a:p>
+          <a:p>
+            <a:r>
+              <a:rPr b="0" lang="en-IE" sz="2000" spc="-1" strike="noStrike">
+                <a:latin typeface="Arial"/>
+              </a:rPr>
+              <a:t>So we've got the the skeleton for that. We now need to start putting in that code, which we know works in separate files into that skeleton to make the DA work. So to do that, I will have a class, will have all the functions in it. We've done seeing that make an instance of a class, then we can import it from someplace else like Flask, etcetera.</a:t>
+            </a:r>
+            <a:endParaRPr b="0" lang="en-IE" sz="2000" spc="-1" strike="noStrike">
+              <a:latin typeface="Arial"/>
+            </a:endParaRPr>
+          </a:p>
+          <a:p>
+            <a:endParaRPr b="0" lang="en-IE" sz="2000" spc="-1" strike="noStrike">
+              <a:latin typeface="Arial"/>
+            </a:endParaRPr>
+          </a:p>
+          <a:p>
+            <a:r>
+              <a:rPr b="0" lang="en-IE" sz="2000" spc="-1" strike="noStrike">
+                <a:latin typeface="Arial"/>
+              </a:rPr>
+              <a:t>So I've made a sample bit of code here called Zed Student DAO which has everything you need. </a:t>
+            </a:r>
+            <a:endParaRPr b="0" lang="en-IE" sz="2000" spc="-1" strike="noStrike">
               <a:latin typeface="Arial"/>
             </a:endParaRPr>
           </a:p>
@@ -1174,7 +1582,7 @@
         <p:txBody>
           <a:bodyPr/>
           <a:p>
-            <a:fld id="{17C237C7-E540-44A1-825A-89421DEFE26A}" type="slidenum">
+            <a:fld id="{A47243CB-A833-493B-8C15-3CD339A57C77}" type="slidenum">
               <a:t>&lt;#&gt;</a:t>
             </a:fld>
           </a:p>
@@ -1362,7 +1770,7 @@
         <p:txBody>
           <a:bodyPr/>
           <a:p>
-            <a:fld id="{B2428CF4-520A-4844-B319-211551350930}" type="slidenum">
+            <a:fld id="{E0E48F2C-AD6E-4279-8330-F4013B85941A}" type="slidenum">
               <a:t>&lt;#&gt;</a:t>
             </a:fld>
           </a:p>
@@ -1618,7 +2026,7 @@
         <p:txBody>
           <a:bodyPr/>
           <a:p>
-            <a:fld id="{2D4D8693-6B95-470D-99D0-2487D2DD3EAE}" type="slidenum">
+            <a:fld id="{CF9F8899-E50D-4812-8200-C786BCA5EFB6}" type="slidenum">
               <a:t>&lt;#&gt;</a:t>
             </a:fld>
           </a:p>
@@ -1942,7 +2350,7 @@
         <p:txBody>
           <a:bodyPr/>
           <a:p>
-            <a:fld id="{6255B621-F6FE-4159-8740-F6B70EFB98E3}" type="slidenum">
+            <a:fld id="{84E9BFC1-0DFA-4C80-A8B2-FCC35D2E42DA}" type="slidenum">
               <a:t>&lt;#&gt;</a:t>
             </a:fld>
           </a:p>
@@ -2025,7 +2433,7 @@
         <p:txBody>
           <a:bodyPr/>
           <a:p>
-            <a:fld id="{60421CC9-C076-4907-8953-3666C91F032C}" type="slidenum">
+            <a:fld id="{83DC5F17-1FBD-49B8-AEC2-761337480B49}" type="slidenum">
               <a:t>&lt;#&gt;</a:t>
             </a:fld>
           </a:p>
@@ -2182,7 +2590,7 @@
         <p:txBody>
           <a:bodyPr/>
           <a:p>
-            <a:fld id="{19C72AF9-EDFD-48C9-88B7-C754577950AB}" type="slidenum">
+            <a:fld id="{05529B58-DC9F-48DB-BD63-D5EC54EF6EF7}" type="slidenum">
               <a:t>&lt;#&gt;</a:t>
             </a:fld>
           </a:p>
@@ -2336,7 +2744,7 @@
         <p:txBody>
           <a:bodyPr/>
           <a:p>
-            <a:fld id="{C4334BB6-2B4B-49D2-9C62-5F78CC679A15}" type="slidenum">
+            <a:fld id="{9B6E919B-E374-4CF6-914D-5E2BEE3D1DF7}" type="slidenum">
               <a:t>&lt;#&gt;</a:t>
             </a:fld>
           </a:p>
@@ -2524,7 +2932,7 @@
         <p:txBody>
           <a:bodyPr/>
           <a:p>
-            <a:fld id="{38E3AC07-FB20-420C-94E5-C9BB32A615BF}" type="slidenum">
+            <a:fld id="{74DD6CCB-FDC8-4912-9FD4-76C63B235D13}" type="slidenum">
               <a:t>&lt;#&gt;</a:t>
             </a:fld>
           </a:p>
@@ -2644,7 +3052,7 @@
         <p:txBody>
           <a:bodyPr/>
           <a:p>
-            <a:fld id="{0BF45780-0918-44A5-9328-3673605E30CB}" type="slidenum">
+            <a:fld id="{93D727FA-C4B1-4CEC-863C-2B339DC00E60}" type="slidenum">
               <a:t>&lt;#&gt;</a:t>
             </a:fld>
           </a:p>
@@ -2764,7 +3172,7 @@
         <p:txBody>
           <a:bodyPr/>
           <a:p>
-            <a:fld id="{9CA4D257-C14D-4A6A-87A2-972218430AD9}" type="slidenum">
+            <a:fld id="{C6977B46-4813-498F-B786-E027AC4054FC}" type="slidenum">
               <a:t>&lt;#&gt;</a:t>
             </a:fld>
           </a:p>
@@ -2986,7 +3394,7 @@
         <p:txBody>
           <a:bodyPr/>
           <a:p>
-            <a:fld id="{88350DCA-88F6-4564-8E51-19A5660D128D}" type="slidenum">
+            <a:fld id="{0024BB0E-ABAC-4061-9B19-5293D6022077}" type="slidenum">
               <a:t>&lt;#&gt;</a:t>
             </a:fld>
           </a:p>
@@ -3143,7 +3551,7 @@
         <p:txBody>
           <a:bodyPr/>
           <a:p>
-            <a:fld id="{C2DCEFF3-8906-42DA-A640-EB7A957FD332}" type="slidenum">
+            <a:fld id="{6778CEE0-DD8B-49AC-9AD5-1B6EFC0B6A0E}" type="slidenum">
               <a:t>&lt;#&gt;</a:t>
             </a:fld>
           </a:p>
@@ -3365,7 +3773,7 @@
         <p:txBody>
           <a:bodyPr/>
           <a:p>
-            <a:fld id="{88D30DB7-6EAB-4654-965F-1E7E02089837}" type="slidenum">
+            <a:fld id="{38766902-B4D1-4A5C-A969-BA834C5E09CE}" type="slidenum">
               <a:t>&lt;#&gt;</a:t>
             </a:fld>
           </a:p>
@@ -3587,7 +3995,7 @@
         <p:txBody>
           <a:bodyPr/>
           <a:p>
-            <a:fld id="{77B166F5-302D-47C1-B7B7-C36C79C0EF26}" type="slidenum">
+            <a:fld id="{1E6799F3-265B-4A3E-B061-3A6654A54E10}" type="slidenum">
               <a:t>&lt;#&gt;</a:t>
             </a:fld>
           </a:p>
@@ -3775,7 +4183,7 @@
         <p:txBody>
           <a:bodyPr/>
           <a:p>
-            <a:fld id="{49314B49-9424-437F-91DD-2E861BB40534}" type="slidenum">
+            <a:fld id="{2097BAED-D2E0-4335-BF03-FD6CC439C866}" type="slidenum">
               <a:t>&lt;#&gt;</a:t>
             </a:fld>
           </a:p>
@@ -4031,7 +4439,7 @@
         <p:txBody>
           <a:bodyPr/>
           <a:p>
-            <a:fld id="{90F590E7-D40B-4011-8D8D-6643C4690294}" type="slidenum">
+            <a:fld id="{78C450ED-2819-4F47-AABA-080A5980AE14}" type="slidenum">
               <a:t>&lt;#&gt;</a:t>
             </a:fld>
           </a:p>
@@ -4355,7 +4763,7 @@
         <p:txBody>
           <a:bodyPr/>
           <a:p>
-            <a:fld id="{F48D014C-F153-4A22-8CD0-67BA5920A5E0}" type="slidenum">
+            <a:fld id="{5EA995AE-B35E-4B82-9CC0-4187AB7B2C87}" type="slidenum">
               <a:t>&lt;#&gt;</a:t>
             </a:fld>
           </a:p>
@@ -4509,7 +4917,7 @@
         <p:txBody>
           <a:bodyPr/>
           <a:p>
-            <a:fld id="{5A86DCC9-1140-4B2F-804F-85E809839133}" type="slidenum">
+            <a:fld id="{AEA7F0E1-9B07-4BD9-99BB-F179A79741FC}" type="slidenum">
               <a:t>&lt;#&gt;</a:t>
             </a:fld>
           </a:p>
@@ -4697,7 +5105,7 @@
         <p:txBody>
           <a:bodyPr/>
           <a:p>
-            <a:fld id="{622F111F-A167-40AE-BB12-7AE7F125C2C1}" type="slidenum">
+            <a:fld id="{A8F470A8-1A0E-4E7F-A5E5-636EA373FCD4}" type="slidenum">
               <a:t>&lt;#&gt;</a:t>
             </a:fld>
           </a:p>
@@ -4817,7 +5225,7 @@
         <p:txBody>
           <a:bodyPr/>
           <a:p>
-            <a:fld id="{53A9CE64-0CA3-460D-9F4A-704B46FE7A22}" type="slidenum">
+            <a:fld id="{1F4B6618-6438-462B-B665-50A4D2F92891}" type="slidenum">
               <a:t>&lt;#&gt;</a:t>
             </a:fld>
           </a:p>
@@ -4937,7 +5345,7 @@
         <p:txBody>
           <a:bodyPr/>
           <a:p>
-            <a:fld id="{5DACC77E-7ECF-49EA-948E-B88EB72D76D4}" type="slidenum">
+            <a:fld id="{1157A135-DF40-4C8B-8ACF-E6C9C035DF86}" type="slidenum">
               <a:t>&lt;#&gt;</a:t>
             </a:fld>
           </a:p>
@@ -5159,7 +5567,7 @@
         <p:txBody>
           <a:bodyPr/>
           <a:p>
-            <a:fld id="{4FCD7862-DE05-44C9-9706-6FC49F78F810}" type="slidenum">
+            <a:fld id="{ADDACEF1-A392-4F1F-ACFB-ECAF66D3D209}" type="slidenum">
               <a:t>&lt;#&gt;</a:t>
             </a:fld>
           </a:p>
@@ -5381,7 +5789,7 @@
         <p:txBody>
           <a:bodyPr/>
           <a:p>
-            <a:fld id="{20A7E142-450F-4269-8541-66A701EC3FF0}" type="slidenum">
+            <a:fld id="{1A0A25FB-0F60-454C-9319-DB2A67960611}" type="slidenum">
               <a:t>&lt;#&gt;</a:t>
             </a:fld>
           </a:p>
@@ -5603,7 +6011,7 @@
         <p:txBody>
           <a:bodyPr/>
           <a:p>
-            <a:fld id="{C87CADCB-AC80-4E9A-9DFD-2AD3EF5C8303}" type="slidenum">
+            <a:fld id="{DCCEE18C-1E59-4326-8250-56FB17877D03}" type="slidenum">
               <a:t>&lt;#&gt;</a:t>
             </a:fld>
           </a:p>
@@ -5668,9 +6076,9 @@
         <p:grpSpPr>
           <a:xfrm>
             <a:off x="11401560" y="6229800"/>
-            <a:ext cx="456120" cy="456120"/>
+            <a:ext cx="455760" cy="455760"/>
             <a:chOff x="11401560" y="6229800"/>
-            <a:chExt cx="456120" cy="456120"/>
+            <a:chExt cx="455760" cy="455760"/>
           </a:xfrm>
         </p:grpSpPr>
         <p:sp>
@@ -5682,7 +6090,7 @@
           <p:spPr>
             <a:xfrm>
               <a:off x="11401560" y="6229800"/>
-              <a:ext cx="456120" cy="456120"/>
+              <a:ext cx="455760" cy="455760"/>
             </a:xfrm>
             <a:prstGeom prst="ellipse">
               <a:avLst/>
@@ -5712,7 +6120,7 @@
           <p:spPr>
             <a:xfrm>
               <a:off x="11431080" y="6258960"/>
-              <a:ext cx="397800" cy="397800"/>
+              <a:ext cx="397440" cy="397440"/>
             </a:xfrm>
             <a:prstGeom prst="ellipse">
               <a:avLst/>
@@ -5742,7 +6150,7 @@
         <p:spPr>
           <a:xfrm>
             <a:off x="920880" y="1347120"/>
-            <a:ext cx="10221840" cy="79560"/>
+            <a:ext cx="10221480" cy="79200"/>
           </a:xfrm>
           <a:prstGeom prst="rect">
             <a:avLst/>
@@ -5782,7 +6190,7 @@
         <p:spPr>
           <a:xfrm>
             <a:off x="920880" y="4299840"/>
-            <a:ext cx="10221840" cy="79560"/>
+            <a:ext cx="10221480" cy="79200"/>
           </a:xfrm>
           <a:prstGeom prst="rect">
             <a:avLst/>
@@ -5822,7 +6230,7 @@
         <p:spPr>
           <a:xfrm>
             <a:off x="920880" y="1484640"/>
-            <a:ext cx="10221840" cy="2742120"/>
+            <a:ext cx="10221480" cy="2741760"/>
           </a:xfrm>
           <a:prstGeom prst="rect">
             <a:avLst/>
@@ -5862,9 +6270,9 @@
         <p:grpSpPr>
           <a:xfrm>
             <a:off x="9649080" y="4069080"/>
-            <a:ext cx="1080000" cy="1080000"/>
+            <a:ext cx="1079640" cy="1079640"/>
             <a:chOff x="9649080" y="4069080"/>
-            <a:chExt cx="1080000" cy="1080000"/>
+            <a:chExt cx="1079640" cy="1079640"/>
           </a:xfrm>
         </p:grpSpPr>
         <p:sp>
@@ -5876,7 +6284,7 @@
           <p:spPr>
             <a:xfrm>
               <a:off x="9649080" y="4069080"/>
-              <a:ext cx="1080000" cy="1080000"/>
+              <a:ext cx="1079640" cy="1079640"/>
             </a:xfrm>
             <a:prstGeom prst="ellipse">
               <a:avLst/>
@@ -5906,7 +6314,7 @@
           <p:spPr>
             <a:xfrm>
               <a:off x="9757440" y="4177080"/>
-              <a:ext cx="863640" cy="863640"/>
+              <a:ext cx="863280" cy="863280"/>
             </a:xfrm>
             <a:prstGeom prst="ellipse">
               <a:avLst/>
@@ -5934,13 +6342,180 @@
             <a:spLocks noGrp="1"/>
           </p:cNvSpPr>
           <p:nvPr>
+            <p:ph type="ftr" idx="1"/>
+          </p:nvPr>
+        </p:nvSpPr>
+        <p:spPr>
+          <a:xfrm>
+            <a:off x="1088280" y="6272640"/>
+            <a:ext cx="6326280" cy="363600"/>
+          </a:xfrm>
+          <a:prstGeom prst="rect">
+            <a:avLst/>
+          </a:prstGeom>
+          <a:noFill/>
+          <a:ln w="0">
+            <a:noFill/>
+          </a:ln>
+        </p:spPr>
+        <p:txBody>
+          <a:bodyPr lIns="90000" rIns="90000" tIns="45000" bIns="45000" anchor="ctr">
+            <a:noAutofit/>
+          </a:bodyPr>
+          <a:lstStyle>
+            <a:lvl1pPr algn="ctr">
+              <a:lnSpc>
+                <a:spcPct val="100000"/>
+              </a:lnSpc>
+              <a:buNone/>
+              <a:defRPr b="0" lang="en-IE" sz="1400" spc="-1" strike="noStrike">
+                <a:latin typeface="Times New Roman"/>
+              </a:defRPr>
+            </a:lvl1pPr>
+          </a:lstStyle>
+          <a:p>
+            <a:pPr algn="ctr">
+              <a:lnSpc>
+                <a:spcPct val="100000"/>
+              </a:lnSpc>
+              <a:buNone/>
+            </a:pPr>
+            <a:r>
+              <a:rPr b="0" lang="en-IE" sz="1400" spc="-1" strike="noStrike">
+                <a:latin typeface="Times New Roman"/>
+              </a:rPr>
+              <a:t>&lt;footer&gt;</a:t>
+            </a:r>
+            <a:endParaRPr b="0" lang="en-IE" sz="1400" spc="-1" strike="noStrike">
+              <a:latin typeface="Times New Roman"/>
+            </a:endParaRPr>
+          </a:p>
+        </p:txBody>
+      </p:sp>
+      <p:sp>
+        <p:nvSpPr>
+          <p:cNvPr id="10" name="PlaceHolder 2"/>
+          <p:cNvSpPr>
+            <a:spLocks noGrp="1"/>
+          </p:cNvSpPr>
+          <p:nvPr>
+            <p:ph type="sldNum" idx="2"/>
+          </p:nvPr>
+        </p:nvSpPr>
+        <p:spPr>
+          <a:xfrm>
+            <a:off x="9592560" y="4289400"/>
+            <a:ext cx="1192320" cy="638640"/>
+          </a:xfrm>
+          <a:prstGeom prst="rect">
+            <a:avLst/>
+          </a:prstGeom>
+          <a:noFill/>
+          <a:ln w="0">
+            <a:noFill/>
+          </a:ln>
+        </p:spPr>
+        <p:txBody>
+          <a:bodyPr lIns="90000" rIns="90000" tIns="45000" bIns="45000" anchor="ctr">
+            <a:noAutofit/>
+          </a:bodyPr>
+          <a:lstStyle>
+            <a:lvl1pPr algn="ctr">
+              <a:lnSpc>
+                <a:spcPct val="100000"/>
+              </a:lnSpc>
+              <a:buNone/>
+              <a:defRPr b="1" lang="en-US" sz="2800" spc="-1" strike="noStrike">
+                <a:solidFill>
+                  <a:srgbClr val="ffffff"/>
+                </a:solidFill>
+                <a:latin typeface="Rockwell Condensed"/>
+              </a:defRPr>
+            </a:lvl1pPr>
+          </a:lstStyle>
+          <a:p>
+            <a:pPr algn="ctr">
+              <a:lnSpc>
+                <a:spcPct val="100000"/>
+              </a:lnSpc>
+              <a:buNone/>
+            </a:pPr>
+            <a:fld id="{13876DC7-BFFF-4A38-9BCA-5F5AB54C2BBB}" type="slidenum">
+              <a:rPr b="1" lang="en-US" sz="2800" spc="-1" strike="noStrike">
+                <a:solidFill>
+                  <a:srgbClr val="ffffff"/>
+                </a:solidFill>
+                <a:latin typeface="Rockwell Condensed"/>
+              </a:rPr>
+              <a:t>&lt;number&gt;</a:t>
+            </a:fld>
+            <a:endParaRPr b="0" lang="en-IE" sz="2800" spc="-1" strike="noStrike">
+              <a:latin typeface="Times New Roman"/>
+            </a:endParaRPr>
+          </a:p>
+        </p:txBody>
+      </p:sp>
+      <p:sp>
+        <p:nvSpPr>
+          <p:cNvPr id="11" name="PlaceHolder 3"/>
+          <p:cNvSpPr>
+            <a:spLocks noGrp="1"/>
+          </p:cNvSpPr>
+          <p:nvPr>
+            <p:ph type="dt" idx="3"/>
+          </p:nvPr>
+        </p:nvSpPr>
+        <p:spPr>
+          <a:xfrm>
+            <a:off x="7964280" y="6272640"/>
+            <a:ext cx="3272040" cy="363600"/>
+          </a:xfrm>
+          <a:prstGeom prst="rect">
+            <a:avLst/>
+          </a:prstGeom>
+          <a:noFill/>
+          <a:ln w="0">
+            <a:noFill/>
+          </a:ln>
+        </p:spPr>
+        <p:txBody>
+          <a:bodyPr lIns="90000" rIns="90000" tIns="45000" bIns="45000" anchor="ctr">
+            <a:noAutofit/>
+          </a:bodyPr>
+          <a:lstStyle>
+            <a:lvl1pPr>
+              <a:defRPr b="0" lang="en-IE" sz="1400" spc="-1" strike="noStrike">
+                <a:latin typeface="Times New Roman"/>
+              </a:defRPr>
+            </a:lvl1pPr>
+          </a:lstStyle>
+          <a:p>
+            <a:r>
+              <a:rPr b="0" lang="en-IE" sz="1400" spc="-1" strike="noStrike">
+                <a:latin typeface="Times New Roman"/>
+              </a:rPr>
+              <a:t>&lt;date/time&gt;</a:t>
+            </a:r>
+            <a:endParaRPr b="0" lang="en-IE" sz="1400" spc="-1" strike="noStrike">
+              <a:latin typeface="Times New Roman"/>
+            </a:endParaRPr>
+          </a:p>
+        </p:txBody>
+      </p:sp>
+      <p:sp>
+        <p:nvSpPr>
+          <p:cNvPr id="12" name="PlaceHolder 4"/>
+          <p:cNvSpPr>
+            <a:spLocks noGrp="1"/>
+          </p:cNvSpPr>
+          <p:nvPr>
             <p:ph type="title"/>
           </p:nvPr>
         </p:nvSpPr>
         <p:spPr>
           <a:xfrm>
             <a:off x="609480" y="273600"/>
-            <a:ext cx="10972080" cy="1144440"/>
+            <a:ext cx="10972440" cy="1144800"/>
           </a:xfrm>
           <a:prstGeom prst="rect">
             <a:avLst/>
@@ -5955,21 +6530,24 @@
             <a:noAutofit/>
           </a:bodyPr>
           <a:p>
-            <a:r>
-              <a:rPr b="0" lang="en-IE" sz="1800" spc="-1" strike="noStrike">
+            <a:pPr algn="ctr">
+              <a:buNone/>
+            </a:pPr>
+            <a:r>
+              <a:rPr b="0" lang="en-IE" sz="4400" spc="-1" strike="noStrike">
                 <a:latin typeface="Arial"/>
               </a:rPr>
               <a:t>Click to edit the title text format</a:t>
             </a:r>
-            <a:endParaRPr b="0" lang="en-IE" sz="1800" spc="-1" strike="noStrike">
-              <a:latin typeface="Arial"/>
-            </a:endParaRPr>
-          </a:p>
-        </p:txBody>
-      </p:sp>
-      <p:sp>
-        <p:nvSpPr>
-          <p:cNvPr id="10" name="PlaceHolder 2"/>
+            <a:endParaRPr b="0" lang="en-IE" sz="4400" spc="-1" strike="noStrike">
+              <a:latin typeface="Arial"/>
+            </a:endParaRPr>
+          </a:p>
+        </p:txBody>
+      </p:sp>
+      <p:sp>
+        <p:nvSpPr>
+          <p:cNvPr id="13" name="PlaceHolder 5"/>
           <p:cNvSpPr>
             <a:spLocks noGrp="1"/>
           </p:cNvSpPr>
@@ -5980,7 +6558,7 @@
         <p:spPr>
           <a:xfrm>
             <a:off x="609480" y="1604520"/>
-            <a:ext cx="10972080" cy="3976920"/>
+            <a:ext cx="10972440" cy="3977280"/>
           </a:xfrm>
           <a:prstGeom prst="rect">
             <a:avLst/>
@@ -6007,12 +6585,12 @@
               <a:buChar char=""/>
             </a:pPr>
             <a:r>
-              <a:rPr b="0" lang="en-IE" sz="1800" spc="-1" strike="noStrike">
+              <a:rPr b="0" lang="en-IE" sz="3200" spc="-1" strike="noStrike">
                 <a:latin typeface="Arial"/>
               </a:rPr>
               <a:t>Click to edit the outline text format</a:t>
             </a:r>
-            <a:endParaRPr b="0" lang="en-IE" sz="1800" spc="-1" strike="noStrike">
+            <a:endParaRPr b="0" lang="en-IE" sz="3200" spc="-1" strike="noStrike">
               <a:latin typeface="Arial"/>
             </a:endParaRPr>
           </a:p>
@@ -6029,12 +6607,12 @@
               <a:buChar char=""/>
             </a:pPr>
             <a:r>
-              <a:rPr b="0" lang="en-IE" sz="1800" spc="-1" strike="noStrike">
+              <a:rPr b="0" lang="en-IE" sz="2800" spc="-1" strike="noStrike">
                 <a:latin typeface="Arial"/>
               </a:rPr>
               <a:t>Second Outline Level</a:t>
             </a:r>
-            <a:endParaRPr b="0" lang="en-IE" sz="1800" spc="-1" strike="noStrike">
+            <a:endParaRPr b="0" lang="en-IE" sz="2800" spc="-1" strike="noStrike">
               <a:latin typeface="Arial"/>
             </a:endParaRPr>
           </a:p>
@@ -6051,12 +6629,12 @@
               <a:buChar char=""/>
             </a:pPr>
             <a:r>
-              <a:rPr b="0" lang="en-IE" sz="1800" spc="-1" strike="noStrike">
+              <a:rPr b="0" lang="en-IE" sz="2400" spc="-1" strike="noStrike">
                 <a:latin typeface="Arial"/>
               </a:rPr>
               <a:t>Third Outline Level</a:t>
             </a:r>
-            <a:endParaRPr b="0" lang="en-IE" sz="1800" spc="-1" strike="noStrike">
+            <a:endParaRPr b="0" lang="en-IE" sz="2400" spc="-1" strike="noStrike">
               <a:latin typeface="Arial"/>
             </a:endParaRPr>
           </a:p>
@@ -6073,12 +6651,12 @@
               <a:buChar char=""/>
             </a:pPr>
             <a:r>
-              <a:rPr b="0" lang="en-IE" sz="1800" spc="-1" strike="noStrike">
+              <a:rPr b="0" lang="en-IE" sz="2000" spc="-1" strike="noStrike">
                 <a:latin typeface="Arial"/>
               </a:rPr>
               <a:t>Fourth Outline Level</a:t>
             </a:r>
-            <a:endParaRPr b="0" lang="en-IE" sz="1800" spc="-1" strike="noStrike">
+            <a:endParaRPr b="0" lang="en-IE" sz="2000" spc="-1" strike="noStrike">
               <a:latin typeface="Arial"/>
             </a:endParaRPr>
           </a:p>
@@ -6095,12 +6673,12 @@
               <a:buChar char=""/>
             </a:pPr>
             <a:r>
-              <a:rPr b="0" lang="en-IE" sz="1800" spc="-1" strike="noStrike">
+              <a:rPr b="0" lang="en-IE" sz="2000" spc="-1" strike="noStrike">
                 <a:latin typeface="Arial"/>
               </a:rPr>
               <a:t>Fifth Outline Level</a:t>
             </a:r>
-            <a:endParaRPr b="0" lang="en-IE" sz="1800" spc="-1" strike="noStrike">
+            <a:endParaRPr b="0" lang="en-IE" sz="2000" spc="-1" strike="noStrike">
               <a:latin typeface="Arial"/>
             </a:endParaRPr>
           </a:p>
@@ -6117,12 +6695,12 @@
               <a:buChar char=""/>
             </a:pPr>
             <a:r>
-              <a:rPr b="0" lang="en-IE" sz="1800" spc="-1" strike="noStrike">
+              <a:rPr b="0" lang="en-IE" sz="2000" spc="-1" strike="noStrike">
                 <a:latin typeface="Arial"/>
               </a:rPr>
               <a:t>Sixth Outline Level</a:t>
             </a:r>
-            <a:endParaRPr b="0" lang="en-IE" sz="1800" spc="-1" strike="noStrike">
+            <a:endParaRPr b="0" lang="en-IE" sz="2000" spc="-1" strike="noStrike">
               <a:latin typeface="Arial"/>
             </a:endParaRPr>
           </a:p>
@@ -6139,180 +6717,13 @@
               <a:buChar char=""/>
             </a:pPr>
             <a:r>
-              <a:rPr b="0" lang="en-IE" sz="1800" spc="-1" strike="noStrike">
+              <a:rPr b="0" lang="en-IE" sz="2000" spc="-1" strike="noStrike">
                 <a:latin typeface="Arial"/>
               </a:rPr>
               <a:t>Seventh Outline Level</a:t>
             </a:r>
-            <a:endParaRPr b="0" lang="en-IE" sz="1800" spc="-1" strike="noStrike">
-              <a:latin typeface="Arial"/>
-            </a:endParaRPr>
-          </a:p>
-        </p:txBody>
-      </p:sp>
-      <p:sp>
-        <p:nvSpPr>
-          <p:cNvPr id="11" name="PlaceHolder 3"/>
-          <p:cNvSpPr>
-            <a:spLocks noGrp="1"/>
-          </p:cNvSpPr>
-          <p:nvPr>
-            <p:ph type="ftr" idx="1"/>
-          </p:nvPr>
-        </p:nvSpPr>
-        <p:spPr>
-          <a:xfrm>
-            <a:off x="1088280" y="6272640"/>
-            <a:ext cx="6326640" cy="363960"/>
-          </a:xfrm>
-          <a:prstGeom prst="rect">
-            <a:avLst/>
-          </a:prstGeom>
-          <a:noFill/>
-          <a:ln w="0">
-            <a:noFill/>
-          </a:ln>
-        </p:spPr>
-        <p:txBody>
-          <a:bodyPr lIns="90000" rIns="90000" tIns="45000" bIns="45000" anchor="ctr">
-            <a:noAutofit/>
-          </a:bodyPr>
-          <a:lstStyle>
-            <a:lvl1pPr algn="ctr">
-              <a:lnSpc>
-                <a:spcPct val="100000"/>
-              </a:lnSpc>
-              <a:buNone/>
-              <a:defRPr b="0" lang="en-IE" sz="1400" spc="-1" strike="noStrike">
-                <a:latin typeface="Times New Roman"/>
-              </a:defRPr>
-            </a:lvl1pPr>
-          </a:lstStyle>
-          <a:p>
-            <a:pPr algn="ctr">
-              <a:lnSpc>
-                <a:spcPct val="100000"/>
-              </a:lnSpc>
-              <a:buNone/>
-            </a:pPr>
-            <a:r>
-              <a:rPr b="0" lang="en-IE" sz="1400" spc="-1" strike="noStrike">
-                <a:latin typeface="Times New Roman"/>
-              </a:rPr>
-              <a:t>&lt;footer&gt;</a:t>
-            </a:r>
-            <a:endParaRPr b="0" lang="en-IE" sz="1400" spc="-1" strike="noStrike">
-              <a:latin typeface="Times New Roman"/>
-            </a:endParaRPr>
-          </a:p>
-        </p:txBody>
-      </p:sp>
-      <p:sp>
-        <p:nvSpPr>
-          <p:cNvPr id="12" name="PlaceHolder 4"/>
-          <p:cNvSpPr>
-            <a:spLocks noGrp="1"/>
-          </p:cNvSpPr>
-          <p:nvPr>
-            <p:ph type="sldNum" idx="2"/>
-          </p:nvPr>
-        </p:nvSpPr>
-        <p:spPr>
-          <a:xfrm>
-            <a:off x="9592560" y="4289400"/>
-            <a:ext cx="1192680" cy="639000"/>
-          </a:xfrm>
-          <a:prstGeom prst="rect">
-            <a:avLst/>
-          </a:prstGeom>
-          <a:noFill/>
-          <a:ln w="0">
-            <a:noFill/>
-          </a:ln>
-        </p:spPr>
-        <p:txBody>
-          <a:bodyPr lIns="90000" rIns="90000" tIns="45000" bIns="45000" anchor="ctr">
-            <a:noAutofit/>
-          </a:bodyPr>
-          <a:lstStyle>
-            <a:lvl1pPr algn="ctr">
-              <a:lnSpc>
-                <a:spcPct val="100000"/>
-              </a:lnSpc>
-              <a:buNone/>
-              <a:defRPr b="1" lang="en-US" sz="2800" spc="-1" strike="noStrike">
-                <a:solidFill>
-                  <a:srgbClr val="ffffff"/>
-                </a:solidFill>
-                <a:latin typeface="Rockwell Condensed"/>
-              </a:defRPr>
-            </a:lvl1pPr>
-          </a:lstStyle>
-          <a:p>
-            <a:pPr algn="ctr">
-              <a:lnSpc>
-                <a:spcPct val="100000"/>
-              </a:lnSpc>
-              <a:buNone/>
-            </a:pPr>
-            <a:fld id="{9B41C532-CF89-431A-9C57-198792F7E29F}" type="slidenum">
-              <a:rPr b="1" lang="en-US" sz="2800" spc="-1" strike="noStrike">
-                <a:solidFill>
-                  <a:srgbClr val="ffffff"/>
-                </a:solidFill>
-                <a:latin typeface="Rockwell Condensed"/>
-              </a:rPr>
-              <a:t>&lt;number&gt;</a:t>
-            </a:fld>
-            <a:endParaRPr b="0" lang="en-IE" sz="2800" spc="-1" strike="noStrike">
-              <a:latin typeface="Times New Roman"/>
-            </a:endParaRPr>
-          </a:p>
-        </p:txBody>
-      </p:sp>
-      <p:sp>
-        <p:nvSpPr>
-          <p:cNvPr id="13" name="PlaceHolder 5"/>
-          <p:cNvSpPr>
-            <a:spLocks noGrp="1"/>
-          </p:cNvSpPr>
-          <p:nvPr>
-            <p:ph type="dt" idx="3"/>
-          </p:nvPr>
-        </p:nvSpPr>
-        <p:spPr>
-          <a:xfrm>
-            <a:off x="7964280" y="6272640"/>
-            <a:ext cx="3272400" cy="363960"/>
-          </a:xfrm>
-          <a:prstGeom prst="rect">
-            <a:avLst/>
-          </a:prstGeom>
-          <a:noFill/>
-          <a:ln w="0">
-            <a:noFill/>
-          </a:ln>
-        </p:spPr>
-        <p:txBody>
-          <a:bodyPr lIns="90000" rIns="90000" tIns="45000" bIns="45000" anchor="ctr">
-            <a:noAutofit/>
-          </a:bodyPr>
-          <a:lstStyle>
-            <a:lvl1pPr>
-              <a:defRPr b="0" lang="en-IE" sz="1400" spc="-1" strike="noStrike">
-                <a:latin typeface="Times New Roman"/>
-              </a:defRPr>
-            </a:lvl1pPr>
-          </a:lstStyle>
-          <a:p>
-            <a:r>
-              <a:rPr b="0" lang="en-IE" sz="1400" spc="-1" strike="noStrike">
-                <a:latin typeface="Times New Roman"/>
-              </a:rPr>
-              <a:t>&lt;date/time&gt;</a:t>
-            </a:r>
-            <a:endParaRPr b="0" lang="en-IE" sz="1400" spc="-1" strike="noStrike">
-              <a:latin typeface="Times New Roman"/>
+            <a:endParaRPr b="0" lang="en-IE" sz="2000" spc="-1" strike="noStrike">
+              <a:latin typeface="Arial"/>
             </a:endParaRPr>
           </a:p>
         </p:txBody>
@@ -6370,9 +6781,9 @@
         <p:grpSpPr>
           <a:xfrm>
             <a:off x="11401560" y="6229800"/>
-            <a:ext cx="456120" cy="456120"/>
+            <a:ext cx="455760" cy="455760"/>
             <a:chOff x="11401560" y="6229800"/>
-            <a:chExt cx="456120" cy="456120"/>
+            <a:chExt cx="455760" cy="455760"/>
           </a:xfrm>
         </p:grpSpPr>
         <p:sp>
@@ -6384,7 +6795,7 @@
           <p:spPr>
             <a:xfrm>
               <a:off x="11401560" y="6229800"/>
-              <a:ext cx="456120" cy="456120"/>
+              <a:ext cx="455760" cy="455760"/>
             </a:xfrm>
             <a:prstGeom prst="ellipse">
               <a:avLst/>
@@ -6414,7 +6825,7 @@
           <p:spPr>
             <a:xfrm>
               <a:off x="11431080" y="6258960"/>
-              <a:ext cx="397800" cy="397800"/>
+              <a:ext cx="397440" cy="397440"/>
             </a:xfrm>
             <a:prstGeom prst="ellipse">
               <a:avLst/>
@@ -6448,7 +6859,7 @@
         <p:spPr>
           <a:xfrm>
             <a:off x="1088280" y="6272640"/>
-            <a:ext cx="6326640" cy="363960"/>
+            <a:ext cx="6326280" cy="363600"/>
           </a:xfrm>
           <a:prstGeom prst="rect">
             <a:avLst/>
@@ -6505,7 +6916,7 @@
         <p:spPr>
           <a:xfrm>
             <a:off x="11311200" y="6272640"/>
-            <a:ext cx="639000" cy="363960"/>
+            <a:ext cx="638640" cy="363600"/>
           </a:xfrm>
           <a:prstGeom prst="rect">
             <a:avLst/>
@@ -6540,7 +6951,7 @@
               </a:lnSpc>
               <a:buNone/>
             </a:pPr>
-            <a:fld id="{ED52950B-2F6C-433E-A788-63F7D65D6DE4}" type="slidenum">
+            <a:fld id="{2DC2E09A-F252-4C90-A696-9D6A148BF977}" type="slidenum">
               <a:rPr b="1" lang="en-US" sz="1400" spc="-1" strike="noStrike">
                 <a:solidFill>
                   <a:srgbClr val="ffffff"/>
@@ -6568,7 +6979,7 @@
         <p:spPr>
           <a:xfrm>
             <a:off x="7964280" y="6272640"/>
-            <a:ext cx="3272400" cy="363960"/>
+            <a:ext cx="3272040" cy="363600"/>
           </a:xfrm>
           <a:prstGeom prst="rect">
             <a:avLst/>
@@ -6878,7 +7289,7 @@
         <p:spPr>
           <a:xfrm>
             <a:off x="1051560" y="1432080"/>
-            <a:ext cx="9965880" cy="3034800"/>
+            <a:ext cx="9965520" cy="3034440"/>
           </a:xfrm>
           <a:prstGeom prst="rect">
             <a:avLst/>
@@ -6924,7 +7335,7 @@
         <p:spPr>
           <a:xfrm>
             <a:off x="859320" y="4356000"/>
-            <a:ext cx="7890120" cy="1068840"/>
+            <a:ext cx="7889760" cy="1068480"/>
           </a:xfrm>
           <a:prstGeom prst="rect">
             <a:avLst/>
@@ -7037,7 +7448,7 @@
         <p:spPr>
           <a:xfrm>
             <a:off x="1069920" y="484560"/>
-            <a:ext cx="10057320" cy="1608120"/>
+            <a:ext cx="10056960" cy="1607760"/>
           </a:xfrm>
           <a:prstGeom prst="rect">
             <a:avLst/>
@@ -7083,7 +7494,7 @@
         <p:spPr>
           <a:xfrm>
             <a:off x="1069920" y="2121480"/>
-            <a:ext cx="10057320" cy="4049640"/>
+            <a:ext cx="10056960" cy="4049280"/>
           </a:xfrm>
           <a:prstGeom prst="rect">
             <a:avLst/>
@@ -7348,7 +7759,7 @@
         <p:spPr>
           <a:xfrm>
             <a:off x="1069920" y="484560"/>
-            <a:ext cx="10057320" cy="1608120"/>
+            <a:ext cx="10056960" cy="1607760"/>
           </a:xfrm>
           <a:prstGeom prst="rect">
             <a:avLst/>
@@ -7394,7 +7805,7 @@
         <p:spPr>
           <a:xfrm>
             <a:off x="1066680" y="2094120"/>
-            <a:ext cx="10057320" cy="4049640"/>
+            <a:ext cx="10056960" cy="4049280"/>
           </a:xfrm>
           <a:prstGeom prst="rect">
             <a:avLst/>
@@ -7517,7 +7928,7 @@
         <p:spPr>
           <a:xfrm>
             <a:off x="1924200" y="3391920"/>
-            <a:ext cx="3717000" cy="281880"/>
+            <a:ext cx="3716640" cy="281880"/>
           </a:xfrm>
           <a:prstGeom prst="rect">
             <a:avLst/>
@@ -7619,7 +8030,7 @@
         <p:spPr>
           <a:xfrm>
             <a:off x="1066680" y="217440"/>
-            <a:ext cx="10057320" cy="1608120"/>
+            <a:ext cx="10056960" cy="1607760"/>
           </a:xfrm>
           <a:prstGeom prst="rect">
             <a:avLst/>
@@ -7661,7 +8072,7 @@
         <p:spPr>
           <a:xfrm>
             <a:off x="1179000" y="1510560"/>
-            <a:ext cx="7770240" cy="5034960"/>
+            <a:ext cx="7769880" cy="5034600"/>
           </a:xfrm>
           <a:prstGeom prst="rect">
             <a:avLst/>
@@ -8173,7 +8584,7 @@
         <p:spPr>
           <a:xfrm>
             <a:off x="9434520" y="1602720"/>
-            <a:ext cx="2322720" cy="912600"/>
+            <a:ext cx="2322360" cy="912600"/>
           </a:xfrm>
           <a:prstGeom prst="rect">
             <a:avLst/>
@@ -8224,8 +8635,8 @@
         </p:nvSpPr>
         <p:spPr>
           <a:xfrm flipH="1">
-            <a:off x="4442040" y="2405880"/>
-            <a:ext cx="4990320" cy="805320"/>
+            <a:off x="4441320" y="2405880"/>
+            <a:ext cx="4989960" cy="804960"/>
           </a:xfrm>
           <a:custGeom>
             <a:avLst/>
@@ -8308,7 +8719,7 @@
         <p:spPr>
           <a:xfrm>
             <a:off x="1069920" y="484560"/>
-            <a:ext cx="10057320" cy="1608120"/>
+            <a:ext cx="10056960" cy="1607760"/>
           </a:xfrm>
           <a:prstGeom prst="rect">
             <a:avLst/>
@@ -8350,7 +8761,7 @@
         <p:spPr>
           <a:xfrm>
             <a:off x="1409400" y="1795320"/>
-            <a:ext cx="8777160" cy="1366200"/>
+            <a:ext cx="8776800" cy="1365840"/>
           </a:xfrm>
           <a:prstGeom prst="rect">
             <a:avLst/>
@@ -8605,7 +9016,7 @@
         <p:spPr>
           <a:xfrm>
             <a:off x="1069920" y="484560"/>
-            <a:ext cx="10057320" cy="1608120"/>
+            <a:ext cx="10056960" cy="1607760"/>
           </a:xfrm>
           <a:prstGeom prst="rect">
             <a:avLst/>
@@ -8647,7 +9058,7 @@
         <p:spPr>
           <a:xfrm>
             <a:off x="1172520" y="1763280"/>
-            <a:ext cx="9497880" cy="4838760"/>
+            <a:ext cx="9497520" cy="4838400"/>
           </a:xfrm>
           <a:prstGeom prst="rect">
             <a:avLst/>
@@ -9292,7 +9703,7 @@
         <p:spPr>
           <a:xfrm>
             <a:off x="1069920" y="484560"/>
-            <a:ext cx="10057320" cy="1608120"/>
+            <a:ext cx="10056960" cy="1607760"/>
           </a:xfrm>
           <a:prstGeom prst="rect">
             <a:avLst/>
@@ -9334,7 +9745,7 @@
         <p:spPr>
           <a:xfrm>
             <a:off x="1063800" y="1795320"/>
-            <a:ext cx="7584480" cy="4410720"/>
+            <a:ext cx="7584120" cy="4410360"/>
           </a:xfrm>
           <a:prstGeom prst="rect">
             <a:avLst/>
@@ -9765,7 +10176,7 @@
         <p:spPr>
           <a:xfrm>
             <a:off x="9187200" y="4292280"/>
-            <a:ext cx="2430000" cy="638280"/>
+            <a:ext cx="2429640" cy="638280"/>
           </a:xfrm>
           <a:prstGeom prst="rect">
             <a:avLst/>
@@ -9817,7 +10228,7 @@
         <p:spPr>
           <a:xfrm flipH="1">
             <a:off x="5291280" y="4453560"/>
-            <a:ext cx="3882600" cy="360"/>
+            <a:ext cx="3882240" cy="360"/>
           </a:xfrm>
           <a:custGeom>
             <a:avLst/>
@@ -9866,7 +10277,7 @@
         <p:spPr>
           <a:xfrm>
             <a:off x="9176400" y="5819760"/>
-            <a:ext cx="1950840" cy="363960"/>
+            <a:ext cx="1950480" cy="363960"/>
           </a:xfrm>
           <a:prstGeom prst="rect">
             <a:avLst/>
@@ -9917,8 +10328,8 @@
         </p:nvSpPr>
         <p:spPr>
           <a:xfrm flipH="1" flipV="1">
-            <a:off x="2710080" y="5183640"/>
-            <a:ext cx="6464160" cy="818280"/>
+            <a:off x="2709360" y="5183640"/>
+            <a:ext cx="6463800" cy="817920"/>
           </a:xfrm>
           <a:custGeom>
             <a:avLst/>
@@ -10031,7 +10442,7 @@
         <p:spPr>
           <a:xfrm>
             <a:off x="1069920" y="484560"/>
-            <a:ext cx="10057320" cy="1608120"/>
+            <a:ext cx="10056960" cy="1607760"/>
           </a:xfrm>
           <a:prstGeom prst="rect">
             <a:avLst/>
@@ -10077,7 +10488,7 @@
         <p:spPr>
           <a:xfrm>
             <a:off x="1069920" y="2121480"/>
-            <a:ext cx="10057320" cy="4049640"/>
+            <a:ext cx="10056960" cy="4049280"/>
           </a:xfrm>
           <a:prstGeom prst="rect">
             <a:avLst/>

</xml_diff>